<commit_message>
Added relevance and scientific innovation
</commit_message>
<xml_diff>
--- a/Diploma/report/PIM24_Ananyev.pptx
+++ b/Diploma/report/PIM24_Ananyev.pptx
@@ -5,16 +5,18 @@
     <p:sldMasterId id="2147483659" r:id="rId1"/>
   </p:sldMasterIdLst>
   <p:notesMasterIdLst>
-    <p:notesMasterId r:id="rId9"/>
+    <p:notesMasterId r:id="rId11"/>
   </p:notesMasterIdLst>
   <p:sldIdLst>
     <p:sldId id="256" r:id="rId2"/>
     <p:sldId id="286" r:id="rId3"/>
-    <p:sldId id="317" r:id="rId4"/>
-    <p:sldId id="318" r:id="rId5"/>
-    <p:sldId id="319" r:id="rId6"/>
-    <p:sldId id="320" r:id="rId7"/>
-    <p:sldId id="321" r:id="rId8"/>
+    <p:sldId id="322" r:id="rId4"/>
+    <p:sldId id="323" r:id="rId5"/>
+    <p:sldId id="317" r:id="rId6"/>
+    <p:sldId id="318" r:id="rId7"/>
+    <p:sldId id="319" r:id="rId8"/>
+    <p:sldId id="320" r:id="rId9"/>
+    <p:sldId id="321" r:id="rId10"/>
   </p:sldIdLst>
   <p:sldSz cx="9144000" cy="6858000" type="screen4x3"/>
   <p:notesSz cx="6858000" cy="9144000"/>
@@ -11017,10 +11019,6 @@
               </a:rPr>
               <a:t>Рыбинск 2025</a:t>
             </a:r>
-            <a:endParaRPr lang="ru-RU" sz="1800" dirty="0">
-              <a:latin typeface="Times New Roman" panose="02020603050405020304" pitchFamily="18" charset="0"/>
-              <a:cs typeface="Times New Roman" panose="02020603050405020304" pitchFamily="18" charset="0"/>
-            </a:endParaRPr>
           </a:p>
         </p:txBody>
       </p:sp>
@@ -11345,6 +11343,335 @@
         </p:nvSpPr>
         <p:spPr>
           <a:xfrm>
+            <a:off x="457200" y="-4439"/>
+            <a:ext cx="8229600" cy="1185169"/>
+          </a:xfrm>
+        </p:spPr>
+        <p:txBody>
+          <a:bodyPr>
+            <a:normAutofit/>
+          </a:bodyPr>
+          <a:lstStyle/>
+          <a:p>
+            <a:r>
+              <a:rPr lang="ru-RU" dirty="0"/>
+              <a:t>Научная новизна </a:t>
+            </a:r>
+            <a:r>
+              <a:rPr lang="ru-RU" dirty="0" smtClean="0"/>
+              <a:t>исследования</a:t>
+            </a:r>
+            <a:endParaRPr lang="ru-RU" dirty="0"/>
+          </a:p>
+        </p:txBody>
+      </p:sp>
+      <p:sp>
+        <p:nvSpPr>
+          <p:cNvPr id="3" name="Text Placeholder 2"/>
+          <p:cNvSpPr>
+            <a:spLocks noGrp="1"/>
+          </p:cNvSpPr>
+          <p:nvPr>
+            <p:ph type="body" idx="1"/>
+          </p:nvPr>
+        </p:nvSpPr>
+        <p:spPr>
+          <a:xfrm>
+            <a:off x="457200" y="1180730"/>
+            <a:ext cx="8229600" cy="5677269"/>
+          </a:xfrm>
+        </p:spPr>
+        <p:txBody>
+          <a:bodyPr>
+            <a:normAutofit/>
+          </a:bodyPr>
+          <a:lstStyle/>
+          <a:p>
+            <a:pPr marL="0" indent="630238" algn="just">
+              <a:buNone/>
+            </a:pPr>
+            <a:r>
+              <a:rPr lang="ru-RU" sz="2800" dirty="0" smtClean="0"/>
+              <a:t>Разрабатываемый алгоритм сможет эффективно </a:t>
+            </a:r>
+            <a:r>
+              <a:rPr lang="ru-RU" sz="2800" dirty="0"/>
+              <a:t>работать в условиях </a:t>
+            </a:r>
+            <a:r>
+              <a:rPr lang="ru-RU" sz="2800" b="1" dirty="0"/>
+              <a:t>неопределенности и разнообразия моделей движения</a:t>
+            </a:r>
+            <a:r>
+              <a:rPr lang="ru-RU" sz="2800" dirty="0"/>
+              <a:t> без необходимости предварительной настройки под конкретные типы траекторий. </a:t>
+            </a:r>
+            <a:endParaRPr lang="ru-RU" sz="2800" dirty="0" smtClean="0"/>
+          </a:p>
+          <a:p>
+            <a:pPr marL="0" indent="630238" algn="just">
+              <a:buNone/>
+            </a:pPr>
+            <a:r>
+              <a:rPr lang="ru-RU" sz="2800" dirty="0" smtClean="0"/>
+              <a:t>Так же новизна достигается за счёт достижения баланса </a:t>
+            </a:r>
+            <a:r>
+              <a:rPr lang="ru-RU" sz="2800" dirty="0"/>
+              <a:t>между тремя критически важными параметрами: </a:t>
+            </a:r>
+            <a:endParaRPr lang="ru-RU" sz="2800" dirty="0" smtClean="0"/>
+          </a:p>
+          <a:p>
+            <a:pPr indent="-457200" algn="just"/>
+            <a:r>
+              <a:rPr lang="ru-RU" sz="2800" dirty="0" smtClean="0"/>
+              <a:t>точностью прогнозирования</a:t>
+            </a:r>
+            <a:r>
+              <a:rPr lang="ru-RU" sz="2800" dirty="0"/>
+              <a:t>,</a:t>
+            </a:r>
+            <a:endParaRPr lang="ru-RU" sz="2800" dirty="0" smtClean="0"/>
+          </a:p>
+          <a:p>
+            <a:pPr indent="-457200" algn="just"/>
+            <a:r>
+              <a:rPr lang="ru-RU" sz="2800" dirty="0" smtClean="0"/>
+              <a:t>скоростью </a:t>
+            </a:r>
+            <a:r>
+              <a:rPr lang="ru-RU" sz="2800" dirty="0"/>
+              <a:t>обработки </a:t>
+            </a:r>
+            <a:r>
+              <a:rPr lang="ru-RU" sz="2800" dirty="0" smtClean="0"/>
+              <a:t>данных,</a:t>
+            </a:r>
+          </a:p>
+          <a:p>
+            <a:pPr indent="-457200" algn="just"/>
+            <a:r>
+              <a:rPr lang="ru-RU" sz="2800" dirty="0" err="1" smtClean="0"/>
+              <a:t>ресурсозатратностью</a:t>
+            </a:r>
+            <a:r>
+              <a:rPr lang="ru-RU" sz="2800" dirty="0" smtClean="0"/>
+              <a:t>.</a:t>
+            </a:r>
+            <a:endParaRPr lang="ru-RU" sz="2800" dirty="0"/>
+          </a:p>
+          <a:p>
+            <a:pPr algn="just"/>
+            <a:endParaRPr lang="ru-RU" sz="2800" dirty="0"/>
+          </a:p>
+        </p:txBody>
+      </p:sp>
+    </p:spTree>
+    <p:extLst>
+      <p:ext uri="{BB962C8B-B14F-4D97-AF65-F5344CB8AC3E}">
+        <p14:creationId xmlns:p14="http://schemas.microsoft.com/office/powerpoint/2010/main" val="389740951"/>
+      </p:ext>
+    </p:extLst>
+  </p:cSld>
+  <p:clrMapOvr>
+    <a:masterClrMapping/>
+  </p:clrMapOvr>
+  <p:timing>
+    <p:tnLst>
+      <p:par>
+        <p:cTn id="1" dur="indefinite" restart="never" nodeType="tmRoot"/>
+      </p:par>
+    </p:tnLst>
+  </p:timing>
+</p:sld>
+</file>
+
+<file path=ppt/slides/slide4.xml><?xml version="1.0" encoding="utf-8"?>
+<p:sld xmlns:a="http://schemas.openxmlformats.org/drawingml/2006/main" xmlns:r="http://schemas.openxmlformats.org/officeDocument/2006/relationships" xmlns:p="http://schemas.openxmlformats.org/presentationml/2006/main">
+  <p:cSld>
+    <p:spTree>
+      <p:nvGrpSpPr>
+        <p:cNvPr id="1" name=""/>
+        <p:cNvGrpSpPr/>
+        <p:nvPr/>
+      </p:nvGrpSpPr>
+      <p:grpSpPr>
+        <a:xfrm>
+          <a:off x="0" y="0"/>
+          <a:ext cx="0" cy="0"/>
+          <a:chOff x="0" y="0"/>
+          <a:chExt cx="0" cy="0"/>
+        </a:xfrm>
+      </p:grpSpPr>
+      <p:sp>
+        <p:nvSpPr>
+          <p:cNvPr id="2" name="Title 1"/>
+          <p:cNvSpPr>
+            <a:spLocks noGrp="1"/>
+          </p:cNvSpPr>
+          <p:nvPr>
+            <p:ph type="title"/>
+          </p:nvPr>
+        </p:nvSpPr>
+        <p:spPr>
+          <a:xfrm>
+            <a:off x="457200" y="0"/>
+            <a:ext cx="8229600" cy="1143000"/>
+          </a:xfrm>
+        </p:spPr>
+        <p:txBody>
+          <a:bodyPr/>
+          <a:lstStyle/>
+          <a:p>
+            <a:r>
+              <a:rPr lang="ru-RU" dirty="0" smtClean="0"/>
+              <a:t>Краткое описание решения</a:t>
+            </a:r>
+            <a:endParaRPr lang="ru-RU" dirty="0"/>
+          </a:p>
+        </p:txBody>
+      </p:sp>
+      <p:sp>
+        <p:nvSpPr>
+          <p:cNvPr id="3" name="Text Placeholder 2"/>
+          <p:cNvSpPr>
+            <a:spLocks noGrp="1"/>
+          </p:cNvSpPr>
+          <p:nvPr>
+            <p:ph type="body" idx="1"/>
+          </p:nvPr>
+        </p:nvSpPr>
+        <p:spPr>
+          <a:xfrm>
+            <a:off x="457200" y="1143000"/>
+            <a:ext cx="8229600" cy="5715000"/>
+          </a:xfrm>
+        </p:spPr>
+        <p:txBody>
+          <a:bodyPr>
+            <a:normAutofit/>
+          </a:bodyPr>
+          <a:lstStyle/>
+          <a:p>
+            <a:pPr algn="just"/>
+            <a:r>
+              <a:rPr lang="ru-RU" sz="2800" dirty="0" smtClean="0"/>
+              <a:t>Решение будет </a:t>
+            </a:r>
+            <a:r>
+              <a:rPr lang="ru-RU" sz="2800" b="1" dirty="0" smtClean="0"/>
+              <a:t>программным</a:t>
+            </a:r>
+            <a:r>
+              <a:rPr lang="ru-RU" sz="2800" dirty="0" smtClean="0"/>
+              <a:t> </a:t>
+            </a:r>
+            <a:r>
+              <a:rPr lang="ru-RU" sz="2800" b="1" dirty="0" smtClean="0"/>
+              <a:t>модулем</a:t>
+            </a:r>
+            <a:r>
+              <a:rPr lang="ru-RU" sz="2800" dirty="0" smtClean="0"/>
+              <a:t> с возможностью внедрения в крупные системы.</a:t>
+            </a:r>
+          </a:p>
+          <a:p>
+            <a:pPr algn="just"/>
+            <a:endParaRPr lang="ru-RU" sz="2800" dirty="0" smtClean="0"/>
+          </a:p>
+          <a:p>
+            <a:pPr algn="just"/>
+            <a:r>
+              <a:rPr lang="ru-RU" sz="2800" dirty="0" smtClean="0"/>
+              <a:t>Классификация объектов может использоваться для адаптации параметров модели.</a:t>
+            </a:r>
+          </a:p>
+          <a:p>
+            <a:pPr algn="just"/>
+            <a:endParaRPr lang="ru-RU" sz="2800" dirty="0"/>
+          </a:p>
+          <a:p>
+            <a:pPr algn="just"/>
+            <a:r>
+              <a:rPr lang="ru-RU" sz="2800" b="1" dirty="0" smtClean="0"/>
+              <a:t>Горизонт</a:t>
+            </a:r>
+            <a:r>
+              <a:rPr lang="ru-RU" sz="2800" dirty="0" smtClean="0"/>
+              <a:t> прогнозирования 1-10 секунд.</a:t>
+            </a:r>
+          </a:p>
+          <a:p>
+            <a:pPr algn="just"/>
+            <a:endParaRPr lang="ru-RU" sz="2800" dirty="0"/>
+          </a:p>
+          <a:p>
+            <a:pPr algn="just"/>
+            <a:r>
+              <a:rPr lang="ru-RU" sz="2800" b="1" dirty="0" smtClean="0"/>
+              <a:t>Универсальность</a:t>
+            </a:r>
+            <a:r>
+              <a:rPr lang="ru-RU" sz="2800" dirty="0" smtClean="0"/>
+              <a:t> заключается в способности адаптироваться к изменяющимся траекториям движения объектов.</a:t>
+            </a:r>
+          </a:p>
+          <a:p>
+            <a:pPr algn="just"/>
+            <a:endParaRPr lang="ru-RU" sz="2800" dirty="0"/>
+          </a:p>
+        </p:txBody>
+      </p:sp>
+    </p:spTree>
+    <p:extLst>
+      <p:ext uri="{BB962C8B-B14F-4D97-AF65-F5344CB8AC3E}">
+        <p14:creationId xmlns:p14="http://schemas.microsoft.com/office/powerpoint/2010/main" val="2110295565"/>
+      </p:ext>
+    </p:extLst>
+  </p:cSld>
+  <p:clrMapOvr>
+    <a:masterClrMapping/>
+  </p:clrMapOvr>
+  <p:timing>
+    <p:tnLst>
+      <p:par>
+        <p:cTn id="1" dur="indefinite" restart="never" nodeType="tmRoot"/>
+      </p:par>
+    </p:tnLst>
+  </p:timing>
+</p:sld>
+</file>
+
+<file path=ppt/slides/slide5.xml><?xml version="1.0" encoding="utf-8"?>
+<p:sld xmlns:a="http://schemas.openxmlformats.org/drawingml/2006/main" xmlns:r="http://schemas.openxmlformats.org/officeDocument/2006/relationships" xmlns:p="http://schemas.openxmlformats.org/presentationml/2006/main">
+  <p:cSld>
+    <p:spTree>
+      <p:nvGrpSpPr>
+        <p:cNvPr id="1" name=""/>
+        <p:cNvGrpSpPr/>
+        <p:nvPr/>
+      </p:nvGrpSpPr>
+      <p:grpSpPr>
+        <a:xfrm>
+          <a:off x="0" y="0"/>
+          <a:ext cx="0" cy="0"/>
+          <a:chOff x="0" y="0"/>
+          <a:chExt cx="0" cy="0"/>
+        </a:xfrm>
+      </p:grpSpPr>
+      <p:sp>
+        <p:nvSpPr>
+          <p:cNvPr id="2" name="Title 1"/>
+          <p:cNvSpPr>
+            <a:spLocks noGrp="1"/>
+          </p:cNvSpPr>
+          <p:nvPr>
+            <p:ph type="title"/>
+          </p:nvPr>
+        </p:nvSpPr>
+        <p:spPr>
+          <a:xfrm>
             <a:off x="457200" y="0"/>
             <a:ext cx="8229600" cy="1222218"/>
           </a:xfrm>
@@ -11375,7 +11702,7 @@
         </p:nvSpPr>
         <p:spPr>
           <a:xfrm>
-            <a:off x="457200" y="2224889"/>
+            <a:off x="457200" y="1731830"/>
             <a:ext cx="8229600" cy="4525963"/>
           </a:xfrm>
         </p:spPr>
@@ -11385,6 +11712,7 @@
           </a:bodyPr>
           <a:lstStyle/>
           <a:p>
+            <a:pPr algn="just"/>
             <a:r>
               <a:rPr lang="ru-RU" sz="2800" b="1" dirty="0" smtClean="0"/>
               <a:t>Автономные </a:t>
@@ -11403,6 +11731,7 @@
             </a:r>
           </a:p>
           <a:p>
+            <a:pPr algn="just"/>
             <a:r>
               <a:rPr lang="ru-RU" sz="2800" b="1" dirty="0" smtClean="0"/>
               <a:t>Робототехника</a:t>
@@ -11413,6 +11742,7 @@
             </a:r>
           </a:p>
           <a:p>
+            <a:pPr algn="just"/>
             <a:r>
               <a:rPr lang="ru-RU" sz="2800" b="1" dirty="0" smtClean="0"/>
               <a:t>Компьютерное зрение</a:t>
@@ -11424,6 +11754,7 @@
             <a:endParaRPr lang="ru-RU" sz="2800" dirty="0"/>
           </a:p>
           <a:p>
+            <a:pPr algn="just"/>
             <a:r>
               <a:rPr lang="ru-RU" sz="2800" b="1" dirty="0" smtClean="0"/>
               <a:t>Аэрокосмическая отрасль</a:t>
@@ -11435,6 +11766,7 @@
             <a:endParaRPr lang="ru-RU" sz="2800" dirty="0"/>
           </a:p>
           <a:p>
+            <a:pPr algn="just"/>
             <a:r>
               <a:rPr lang="ru-RU" sz="2800" b="1" dirty="0" smtClean="0"/>
               <a:t>Игровая индустрия</a:t>
@@ -11443,9 +11775,17 @@
               <a:rPr lang="ru-RU" sz="2800" dirty="0" smtClean="0"/>
               <a:t>.</a:t>
             </a:r>
-            <a:endParaRPr lang="ru-RU" sz="2800" dirty="0"/>
           </a:p>
           <a:p>
+            <a:pPr algn="just"/>
+            <a:r>
+              <a:rPr lang="ru-RU" sz="2800" b="1" dirty="0" smtClean="0"/>
+              <a:t>Автоматизированные системы управления воздушным движением</a:t>
+            </a:r>
+            <a:endParaRPr lang="ru-RU" sz="2800" b="1" dirty="0"/>
+          </a:p>
+          <a:p>
+            <a:pPr algn="just"/>
             <a:endParaRPr lang="ru-RU" sz="2800" dirty="0"/>
           </a:p>
         </p:txBody>
@@ -11460,10 +11800,17 @@
   <p:clrMapOvr>
     <a:masterClrMapping/>
   </p:clrMapOvr>
+  <p:timing>
+    <p:tnLst>
+      <p:par>
+        <p:cTn id="1" dur="indefinite" restart="never" nodeType="tmRoot"/>
+      </p:par>
+    </p:tnLst>
+  </p:timing>
 </p:sld>
 </file>
 
-<file path=ppt/slides/slide4.xml><?xml version="1.0" encoding="utf-8"?>
+<file path=ppt/slides/slide6.xml><?xml version="1.0" encoding="utf-8"?>
 <p:sld xmlns:a="http://schemas.openxmlformats.org/drawingml/2006/main" xmlns:r="http://schemas.openxmlformats.org/officeDocument/2006/relationships" xmlns:p="http://schemas.openxmlformats.org/presentationml/2006/main">
   <p:cSld>
     <p:spTree>
@@ -11660,7 +12007,7 @@
 </p:sld>
 </file>
 
-<file path=ppt/slides/slide5.xml><?xml version="1.0" encoding="utf-8"?>
+<file path=ppt/slides/slide7.xml><?xml version="1.0" encoding="utf-8"?>
 <p:sld xmlns:a="http://schemas.openxmlformats.org/drawingml/2006/main" xmlns:r="http://schemas.openxmlformats.org/officeDocument/2006/relationships" xmlns:p="http://schemas.openxmlformats.org/presentationml/2006/main">
   <p:cSld>
     <p:spTree>
@@ -13199,7 +13546,7 @@
 </p:sld>
 </file>
 
-<file path=ppt/slides/slide6.xml><?xml version="1.0" encoding="utf-8"?>
+<file path=ppt/slides/slide8.xml><?xml version="1.0" encoding="utf-8"?>
 <p:sld xmlns:a="http://schemas.openxmlformats.org/drawingml/2006/main" xmlns:r="http://schemas.openxmlformats.org/officeDocument/2006/relationships" xmlns:p="http://schemas.openxmlformats.org/presentationml/2006/main">
   <p:cSld>
     <p:spTree>
@@ -13994,7 +14341,7 @@
 </p:sld>
 </file>
 
-<file path=ppt/slides/slide7.xml><?xml version="1.0" encoding="utf-8"?>
+<file path=ppt/slides/slide9.xml><?xml version="1.0" encoding="utf-8"?>
 <p:sld xmlns:a="http://schemas.openxmlformats.org/drawingml/2006/main" xmlns:r="http://schemas.openxmlformats.org/officeDocument/2006/relationships" xmlns:p="http://schemas.openxmlformats.org/presentationml/2006/main">
   <p:cSld>
     <p:spTree>

</xml_diff>